<commit_message>
add some results for multi_scale_attnen
</commit_message>
<xml_diff>
--- a/Share/Muti_Scale_Result.pptx
+++ b/Share/Muti_Scale_Result.pptx
@@ -8,6 +8,7 @@
     <p:sldId id="256" r:id="rId2"/>
     <p:sldId id="257" r:id="rId3"/>
     <p:sldId id="258" r:id="rId4"/>
+    <p:sldId id="259" r:id="rId5"/>
   </p:sldIdLst>
   <p:sldSz cx="12192000" cy="6858000"/>
   <p:notesSz cx="6858000" cy="9144000"/>
@@ -106,6 +107,11 @@
       </a:defRPr>
     </a:lvl9pPr>
   </p:defaultTextStyle>
+  <p:extLst>
+    <p:ext uri="{EFAFB233-063F-42B5-8137-9DF3F51BA10A}">
+      <p15:sldGuideLst xmlns:p15="http://schemas.microsoft.com/office/powerpoint/2012/main"/>
+    </p:ext>
+  </p:extLst>
 </p:presentation>
 </file>
 
@@ -256,7 +262,7 @@
           <a:p>
             <a:fld id="{254B8ECA-FE5A-4016-B90B-4B11527A1335}" type="datetimeFigureOut">
               <a:rPr lang="zh-CN" altLang="en-US" smtClean="0"/>
-              <a:t>2020/10/12</a:t>
+              <a:t>2020/10/16</a:t>
             </a:fld>
             <a:endParaRPr lang="zh-CN" altLang="en-US"/>
           </a:p>
@@ -454,7 +460,7 @@
           <a:p>
             <a:fld id="{254B8ECA-FE5A-4016-B90B-4B11527A1335}" type="datetimeFigureOut">
               <a:rPr lang="zh-CN" altLang="en-US" smtClean="0"/>
-              <a:t>2020/10/12</a:t>
+              <a:t>2020/10/16</a:t>
             </a:fld>
             <a:endParaRPr lang="zh-CN" altLang="en-US"/>
           </a:p>
@@ -662,7 +668,7 @@
           <a:p>
             <a:fld id="{254B8ECA-FE5A-4016-B90B-4B11527A1335}" type="datetimeFigureOut">
               <a:rPr lang="zh-CN" altLang="en-US" smtClean="0"/>
-              <a:t>2020/10/12</a:t>
+              <a:t>2020/10/16</a:t>
             </a:fld>
             <a:endParaRPr lang="zh-CN" altLang="en-US"/>
           </a:p>
@@ -860,7 +866,7 @@
           <a:p>
             <a:fld id="{254B8ECA-FE5A-4016-B90B-4B11527A1335}" type="datetimeFigureOut">
               <a:rPr lang="zh-CN" altLang="en-US" smtClean="0"/>
-              <a:t>2020/10/12</a:t>
+              <a:t>2020/10/16</a:t>
             </a:fld>
             <a:endParaRPr lang="zh-CN" altLang="en-US"/>
           </a:p>
@@ -1135,7 +1141,7 @@
           <a:p>
             <a:fld id="{254B8ECA-FE5A-4016-B90B-4B11527A1335}" type="datetimeFigureOut">
               <a:rPr lang="zh-CN" altLang="en-US" smtClean="0"/>
-              <a:t>2020/10/12</a:t>
+              <a:t>2020/10/16</a:t>
             </a:fld>
             <a:endParaRPr lang="zh-CN" altLang="en-US"/>
           </a:p>
@@ -1400,7 +1406,7 @@
           <a:p>
             <a:fld id="{254B8ECA-FE5A-4016-B90B-4B11527A1335}" type="datetimeFigureOut">
               <a:rPr lang="zh-CN" altLang="en-US" smtClean="0"/>
-              <a:t>2020/10/12</a:t>
+              <a:t>2020/10/16</a:t>
             </a:fld>
             <a:endParaRPr lang="zh-CN" altLang="en-US"/>
           </a:p>
@@ -1812,7 +1818,7 @@
           <a:p>
             <a:fld id="{254B8ECA-FE5A-4016-B90B-4B11527A1335}" type="datetimeFigureOut">
               <a:rPr lang="zh-CN" altLang="en-US" smtClean="0"/>
-              <a:t>2020/10/12</a:t>
+              <a:t>2020/10/16</a:t>
             </a:fld>
             <a:endParaRPr lang="zh-CN" altLang="en-US"/>
           </a:p>
@@ -1953,7 +1959,7 @@
           <a:p>
             <a:fld id="{254B8ECA-FE5A-4016-B90B-4B11527A1335}" type="datetimeFigureOut">
               <a:rPr lang="zh-CN" altLang="en-US" smtClean="0"/>
-              <a:t>2020/10/12</a:t>
+              <a:t>2020/10/16</a:t>
             </a:fld>
             <a:endParaRPr lang="zh-CN" altLang="en-US"/>
           </a:p>
@@ -2066,7 +2072,7 @@
           <a:p>
             <a:fld id="{254B8ECA-FE5A-4016-B90B-4B11527A1335}" type="datetimeFigureOut">
               <a:rPr lang="zh-CN" altLang="en-US" smtClean="0"/>
-              <a:t>2020/10/12</a:t>
+              <a:t>2020/10/16</a:t>
             </a:fld>
             <a:endParaRPr lang="zh-CN" altLang="en-US"/>
           </a:p>
@@ -2377,7 +2383,7 @@
           <a:p>
             <a:fld id="{254B8ECA-FE5A-4016-B90B-4B11527A1335}" type="datetimeFigureOut">
               <a:rPr lang="zh-CN" altLang="en-US" smtClean="0"/>
-              <a:t>2020/10/12</a:t>
+              <a:t>2020/10/16</a:t>
             </a:fld>
             <a:endParaRPr lang="zh-CN" altLang="en-US"/>
           </a:p>
@@ -2665,7 +2671,7 @@
           <a:p>
             <a:fld id="{254B8ECA-FE5A-4016-B90B-4B11527A1335}" type="datetimeFigureOut">
               <a:rPr lang="zh-CN" altLang="en-US" smtClean="0"/>
-              <a:t>2020/10/12</a:t>
+              <a:t>2020/10/16</a:t>
             </a:fld>
             <a:endParaRPr lang="zh-CN" altLang="en-US"/>
           </a:p>
@@ -2906,7 +2912,7 @@
           <a:p>
             <a:fld id="{254B8ECA-FE5A-4016-B90B-4B11527A1335}" type="datetimeFigureOut">
               <a:rPr lang="zh-CN" altLang="en-US" smtClean="0"/>
-              <a:t>2020/10/12</a:t>
+              <a:t>2020/10/16</a:t>
             </a:fld>
             <a:endParaRPr lang="zh-CN" altLang="en-US"/>
           </a:p>
@@ -3477,6 +3483,13 @@
   <p:clrMapOvr>
     <a:masterClrMapping/>
   </p:clrMapOvr>
+  <p:timing>
+    <p:tnLst>
+      <p:par>
+        <p:cTn id="1" dur="indefinite" restart="never" nodeType="tmRoot"/>
+      </p:par>
+    </p:tnLst>
+  </p:timing>
 </p:sld>
 </file>
 
@@ -3687,6 +3700,13 @@
   <p:clrMapOvr>
     <a:masterClrMapping/>
   </p:clrMapOvr>
+  <p:timing>
+    <p:tnLst>
+      <p:par>
+        <p:cTn id="1" dur="indefinite" restart="never" nodeType="tmRoot"/>
+      </p:par>
+    </p:tnLst>
+  </p:timing>
 </p:sld>
 </file>
 
@@ -3897,6 +3917,266 @@
   <p:clrMapOvr>
     <a:masterClrMapping/>
   </p:clrMapOvr>
+  <p:timing>
+    <p:tnLst>
+      <p:par>
+        <p:cTn id="1" dur="indefinite" restart="never" nodeType="tmRoot"/>
+      </p:par>
+    </p:tnLst>
+  </p:timing>
+</p:sld>
+</file>
+
+<file path=ppt/slides/slide4.xml><?xml version="1.0" encoding="utf-8"?>
+<p:sld xmlns:a="http://schemas.openxmlformats.org/drawingml/2006/main" xmlns:r="http://schemas.openxmlformats.org/officeDocument/2006/relationships" xmlns:p="http://schemas.openxmlformats.org/presentationml/2006/main">
+  <p:cSld>
+    <p:spTree>
+      <p:nvGrpSpPr>
+        <p:cNvPr id="1" name=""/>
+        <p:cNvGrpSpPr/>
+        <p:nvPr/>
+      </p:nvGrpSpPr>
+      <p:grpSpPr>
+        <a:xfrm>
+          <a:off x="0" y="0"/>
+          <a:ext cx="0" cy="0"/>
+          <a:chOff x="0" y="0"/>
+          <a:chExt cx="0" cy="0"/>
+        </a:xfrm>
+      </p:grpSpPr>
+      <p:pic>
+        <p:nvPicPr>
+          <p:cNvPr id="2" name="图片 1"/>
+          <p:cNvPicPr>
+            <a:picLocks noChangeAspect="1"/>
+          </p:cNvPicPr>
+          <p:nvPr/>
+        </p:nvPicPr>
+        <p:blipFill>
+          <a:blip r:embed="rId2"/>
+          <a:stretch>
+            <a:fillRect/>
+          </a:stretch>
+        </p:blipFill>
+        <p:spPr>
+          <a:xfrm>
+            <a:off x="228107" y="-703498"/>
+            <a:ext cx="3966333" cy="2974750"/>
+          </a:xfrm>
+          <a:prstGeom prst="rect">
+            <a:avLst/>
+          </a:prstGeom>
+        </p:spPr>
+      </p:pic>
+      <p:pic>
+        <p:nvPicPr>
+          <p:cNvPr id="3" name="图片 2"/>
+          <p:cNvPicPr>
+            <a:picLocks noChangeAspect="1"/>
+          </p:cNvPicPr>
+          <p:nvPr/>
+        </p:nvPicPr>
+        <p:blipFill>
+          <a:blip r:embed="rId3"/>
+          <a:stretch>
+            <a:fillRect/>
+          </a:stretch>
+        </p:blipFill>
+        <p:spPr>
+          <a:xfrm>
+            <a:off x="4194440" y="-703498"/>
+            <a:ext cx="3964800" cy="2973600"/>
+          </a:xfrm>
+          <a:prstGeom prst="rect">
+            <a:avLst/>
+          </a:prstGeom>
+        </p:spPr>
+      </p:pic>
+      <p:pic>
+        <p:nvPicPr>
+          <p:cNvPr id="4" name="图片 3"/>
+          <p:cNvPicPr>
+            <a:picLocks noChangeAspect="1"/>
+          </p:cNvPicPr>
+          <p:nvPr/>
+        </p:nvPicPr>
+        <p:blipFill>
+          <a:blip r:embed="rId4"/>
+          <a:stretch>
+            <a:fillRect/>
+          </a:stretch>
+        </p:blipFill>
+        <p:spPr>
+          <a:xfrm>
+            <a:off x="8159240" y="-703498"/>
+            <a:ext cx="3964800" cy="2973600"/>
+          </a:xfrm>
+          <a:prstGeom prst="rect">
+            <a:avLst/>
+          </a:prstGeom>
+        </p:spPr>
+      </p:pic>
+      <p:pic>
+        <p:nvPicPr>
+          <p:cNvPr id="5" name="图片 4"/>
+          <p:cNvPicPr>
+            <a:picLocks noChangeAspect="1"/>
+          </p:cNvPicPr>
+          <p:nvPr/>
+        </p:nvPicPr>
+        <p:blipFill>
+          <a:blip r:embed="rId5"/>
+          <a:stretch>
+            <a:fillRect/>
+          </a:stretch>
+        </p:blipFill>
+        <p:spPr>
+          <a:xfrm>
+            <a:off x="229640" y="1467465"/>
+            <a:ext cx="3964800" cy="2973600"/>
+          </a:xfrm>
+          <a:prstGeom prst="rect">
+            <a:avLst/>
+          </a:prstGeom>
+        </p:spPr>
+      </p:pic>
+      <p:pic>
+        <p:nvPicPr>
+          <p:cNvPr id="6" name="图片 5"/>
+          <p:cNvPicPr>
+            <a:picLocks noChangeAspect="1"/>
+          </p:cNvPicPr>
+          <p:nvPr/>
+        </p:nvPicPr>
+        <p:blipFill>
+          <a:blip r:embed="rId6"/>
+          <a:stretch>
+            <a:fillRect/>
+          </a:stretch>
+        </p:blipFill>
+        <p:spPr>
+          <a:xfrm>
+            <a:off x="4194440" y="1467465"/>
+            <a:ext cx="3964800" cy="2973600"/>
+          </a:xfrm>
+          <a:prstGeom prst="rect">
+            <a:avLst/>
+          </a:prstGeom>
+        </p:spPr>
+      </p:pic>
+      <p:pic>
+        <p:nvPicPr>
+          <p:cNvPr id="7" name="图片 6"/>
+          <p:cNvPicPr>
+            <a:picLocks noChangeAspect="1"/>
+          </p:cNvPicPr>
+          <p:nvPr/>
+        </p:nvPicPr>
+        <p:blipFill>
+          <a:blip r:embed="rId6"/>
+          <a:stretch>
+            <a:fillRect/>
+          </a:stretch>
+        </p:blipFill>
+        <p:spPr>
+          <a:xfrm>
+            <a:off x="8159240" y="1467465"/>
+            <a:ext cx="3964800" cy="2973600"/>
+          </a:xfrm>
+          <a:prstGeom prst="rect">
+            <a:avLst/>
+          </a:prstGeom>
+        </p:spPr>
+      </p:pic>
+      <p:pic>
+        <p:nvPicPr>
+          <p:cNvPr id="8" name="图片 7"/>
+          <p:cNvPicPr>
+            <a:picLocks noChangeAspect="1"/>
+          </p:cNvPicPr>
+          <p:nvPr/>
+        </p:nvPicPr>
+        <p:blipFill>
+          <a:blip r:embed="rId7"/>
+          <a:stretch>
+            <a:fillRect/>
+          </a:stretch>
+        </p:blipFill>
+        <p:spPr>
+          <a:xfrm>
+            <a:off x="228107" y="3638428"/>
+            <a:ext cx="3964800" cy="2973600"/>
+          </a:xfrm>
+          <a:prstGeom prst="rect">
+            <a:avLst/>
+          </a:prstGeom>
+        </p:spPr>
+      </p:pic>
+      <p:pic>
+        <p:nvPicPr>
+          <p:cNvPr id="9" name="图片 8"/>
+          <p:cNvPicPr>
+            <a:picLocks noChangeAspect="1"/>
+          </p:cNvPicPr>
+          <p:nvPr/>
+        </p:nvPicPr>
+        <p:blipFill>
+          <a:blip r:embed="rId8"/>
+          <a:stretch>
+            <a:fillRect/>
+          </a:stretch>
+        </p:blipFill>
+        <p:spPr>
+          <a:xfrm>
+            <a:off x="4192907" y="3638428"/>
+            <a:ext cx="3964800" cy="2973600"/>
+          </a:xfrm>
+          <a:prstGeom prst="rect">
+            <a:avLst/>
+          </a:prstGeom>
+        </p:spPr>
+      </p:pic>
+      <p:pic>
+        <p:nvPicPr>
+          <p:cNvPr id="10" name="图片 9"/>
+          <p:cNvPicPr>
+            <a:picLocks noChangeAspect="1"/>
+          </p:cNvPicPr>
+          <p:nvPr/>
+        </p:nvPicPr>
+        <p:blipFill>
+          <a:blip r:embed="rId9"/>
+          <a:stretch>
+            <a:fillRect/>
+          </a:stretch>
+        </p:blipFill>
+        <p:spPr>
+          <a:xfrm>
+            <a:off x="8159240" y="3638428"/>
+            <a:ext cx="3964800" cy="2973600"/>
+          </a:xfrm>
+          <a:prstGeom prst="rect">
+            <a:avLst/>
+          </a:prstGeom>
+        </p:spPr>
+      </p:pic>
+    </p:spTree>
+    <p:extLst>
+      <p:ext uri="{BB962C8B-B14F-4D97-AF65-F5344CB8AC3E}">
+        <p14:creationId xmlns:p14="http://schemas.microsoft.com/office/powerpoint/2010/main" val="1988423907"/>
+      </p:ext>
+    </p:extLst>
+  </p:cSld>
+  <p:clrMapOvr>
+    <a:masterClrMapping/>
+  </p:clrMapOvr>
+  <p:timing>
+    <p:tnLst>
+      <p:par>
+        <p:cTn id="1" dur="indefinite" restart="never" nodeType="tmRoot"/>
+      </p:par>
+    </p:tnLst>
+  </p:timing>
 </p:sld>
 </file>
 

</xml_diff>

<commit_message>
complete muti_scale_result&simplify BACs&Tencent 3D segmentation added
</commit_message>
<xml_diff>
--- a/Share/Muti_Scale_Result.pptx
+++ b/Share/Muti_Scale_Result.pptx
@@ -4,11 +4,16 @@
   <p:sldMasterIdLst>
     <p:sldMasterId id="2147483648" r:id="rId1"/>
   </p:sldMasterIdLst>
+  <p:notesMasterIdLst>
+    <p:notesMasterId r:id="rId8"/>
+  </p:notesMasterIdLst>
   <p:sldIdLst>
-    <p:sldId id="256" r:id="rId2"/>
-    <p:sldId id="257" r:id="rId3"/>
-    <p:sldId id="258" r:id="rId4"/>
-    <p:sldId id="259" r:id="rId5"/>
+    <p:sldId id="260" r:id="rId2"/>
+    <p:sldId id="261" r:id="rId3"/>
+    <p:sldId id="256" r:id="rId4"/>
+    <p:sldId id="257" r:id="rId5"/>
+    <p:sldId id="258" r:id="rId6"/>
+    <p:sldId id="259" r:id="rId7"/>
   </p:sldIdLst>
   <p:sldSz cx="12192000" cy="6858000"/>
   <p:notesSz cx="6858000" cy="9144000"/>
@@ -113,6 +118,440 @@
     </p:ext>
   </p:extLst>
 </p:presentation>
+</file>
+
+<file path=ppt/notesMasters/notesMaster1.xml><?xml version="1.0" encoding="utf-8"?>
+<p:notesMaster xmlns:a="http://schemas.openxmlformats.org/drawingml/2006/main" xmlns:r="http://schemas.openxmlformats.org/officeDocument/2006/relationships" xmlns:p="http://schemas.openxmlformats.org/presentationml/2006/main">
+  <p:cSld>
+    <p:bg>
+      <p:bgRef idx="1001">
+        <a:schemeClr val="bg1"/>
+      </p:bgRef>
+    </p:bg>
+    <p:spTree>
+      <p:nvGrpSpPr>
+        <p:cNvPr id="1" name=""/>
+        <p:cNvGrpSpPr/>
+        <p:nvPr/>
+      </p:nvGrpSpPr>
+      <p:grpSpPr>
+        <a:xfrm>
+          <a:off x="0" y="0"/>
+          <a:ext cx="0" cy="0"/>
+          <a:chOff x="0" y="0"/>
+          <a:chExt cx="0" cy="0"/>
+        </a:xfrm>
+      </p:grpSpPr>
+      <p:sp>
+        <p:nvSpPr>
+          <p:cNvPr id="2" name="页眉占位符 1"/>
+          <p:cNvSpPr>
+            <a:spLocks noGrp="1"/>
+          </p:cNvSpPr>
+          <p:nvPr>
+            <p:ph type="hdr" sz="quarter"/>
+          </p:nvPr>
+        </p:nvSpPr>
+        <p:spPr>
+          <a:xfrm>
+            <a:off x="0" y="0"/>
+            <a:ext cx="2971800" cy="458788"/>
+          </a:xfrm>
+          <a:prstGeom prst="rect">
+            <a:avLst/>
+          </a:prstGeom>
+        </p:spPr>
+        <p:txBody>
+          <a:bodyPr vert="horz" lIns="91440" tIns="45720" rIns="91440" bIns="45720" rtlCol="0"/>
+          <a:lstStyle>
+            <a:lvl1pPr algn="l">
+              <a:defRPr sz="1200"/>
+            </a:lvl1pPr>
+          </a:lstStyle>
+          <a:p>
+            <a:endParaRPr lang="zh-CN" altLang="en-US"/>
+          </a:p>
+        </p:txBody>
+      </p:sp>
+      <p:sp>
+        <p:nvSpPr>
+          <p:cNvPr id="3" name="日期占位符 2"/>
+          <p:cNvSpPr>
+            <a:spLocks noGrp="1"/>
+          </p:cNvSpPr>
+          <p:nvPr>
+            <p:ph type="dt" idx="1"/>
+          </p:nvPr>
+        </p:nvSpPr>
+        <p:spPr>
+          <a:xfrm>
+            <a:off x="3884613" y="0"/>
+            <a:ext cx="2971800" cy="458788"/>
+          </a:xfrm>
+          <a:prstGeom prst="rect">
+            <a:avLst/>
+          </a:prstGeom>
+        </p:spPr>
+        <p:txBody>
+          <a:bodyPr vert="horz" lIns="91440" tIns="45720" rIns="91440" bIns="45720" rtlCol="0"/>
+          <a:lstStyle>
+            <a:lvl1pPr algn="r">
+              <a:defRPr sz="1200"/>
+            </a:lvl1pPr>
+          </a:lstStyle>
+          <a:p>
+            <a:fld id="{89B4DFEA-4E39-4252-A9E3-77A4E41338F0}" type="datetimeFigureOut">
+              <a:rPr lang="zh-CN" altLang="en-US" smtClean="0"/>
+              <a:t>2020/10/16</a:t>
+            </a:fld>
+            <a:endParaRPr lang="zh-CN" altLang="en-US"/>
+          </a:p>
+        </p:txBody>
+      </p:sp>
+      <p:sp>
+        <p:nvSpPr>
+          <p:cNvPr id="4" name="幻灯片图像占位符 3"/>
+          <p:cNvSpPr>
+            <a:spLocks noGrp="1" noRot="1" noChangeAspect="1"/>
+          </p:cNvSpPr>
+          <p:nvPr>
+            <p:ph type="sldImg" idx="2"/>
+          </p:nvPr>
+        </p:nvSpPr>
+        <p:spPr>
+          <a:xfrm>
+            <a:off x="685800" y="1143000"/>
+            <a:ext cx="5486400" cy="3086100"/>
+          </a:xfrm>
+          <a:prstGeom prst="rect">
+            <a:avLst/>
+          </a:prstGeom>
+          <a:noFill/>
+          <a:ln w="12700">
+            <a:solidFill>
+              <a:prstClr val="black"/>
+            </a:solidFill>
+          </a:ln>
+        </p:spPr>
+        <p:txBody>
+          <a:bodyPr vert="horz" lIns="91440" tIns="45720" rIns="91440" bIns="45720" rtlCol="0" anchor="ctr"/>
+          <a:lstStyle/>
+          <a:p>
+            <a:endParaRPr lang="zh-CN" altLang="en-US"/>
+          </a:p>
+        </p:txBody>
+      </p:sp>
+      <p:sp>
+        <p:nvSpPr>
+          <p:cNvPr id="5" name="备注占位符 4"/>
+          <p:cNvSpPr>
+            <a:spLocks noGrp="1"/>
+          </p:cNvSpPr>
+          <p:nvPr>
+            <p:ph type="body" sz="quarter" idx="3"/>
+          </p:nvPr>
+        </p:nvSpPr>
+        <p:spPr>
+          <a:xfrm>
+            <a:off x="685800" y="4400550"/>
+            <a:ext cx="5486400" cy="3600450"/>
+          </a:xfrm>
+          <a:prstGeom prst="rect">
+            <a:avLst/>
+          </a:prstGeom>
+        </p:spPr>
+        <p:txBody>
+          <a:bodyPr vert="horz" lIns="91440" tIns="45720" rIns="91440" bIns="45720" rtlCol="0"/>
+          <a:lstStyle/>
+          <a:p>
+            <a:pPr lvl="0"/>
+            <a:r>
+              <a:rPr lang="zh-CN" altLang="en-US" smtClean="0"/>
+              <a:t>编辑母版文本样式</a:t>
+            </a:r>
+          </a:p>
+          <a:p>
+            <a:pPr lvl="1"/>
+            <a:r>
+              <a:rPr lang="zh-CN" altLang="en-US" smtClean="0"/>
+              <a:t>第二级</a:t>
+            </a:r>
+          </a:p>
+          <a:p>
+            <a:pPr lvl="2"/>
+            <a:r>
+              <a:rPr lang="zh-CN" altLang="en-US" smtClean="0"/>
+              <a:t>第三级</a:t>
+            </a:r>
+          </a:p>
+          <a:p>
+            <a:pPr lvl="3"/>
+            <a:r>
+              <a:rPr lang="zh-CN" altLang="en-US" smtClean="0"/>
+              <a:t>第四级</a:t>
+            </a:r>
+          </a:p>
+          <a:p>
+            <a:pPr lvl="4"/>
+            <a:r>
+              <a:rPr lang="zh-CN" altLang="en-US" smtClean="0"/>
+              <a:t>第五级</a:t>
+            </a:r>
+            <a:endParaRPr lang="zh-CN" altLang="en-US"/>
+          </a:p>
+        </p:txBody>
+      </p:sp>
+      <p:sp>
+        <p:nvSpPr>
+          <p:cNvPr id="6" name="页脚占位符 5"/>
+          <p:cNvSpPr>
+            <a:spLocks noGrp="1"/>
+          </p:cNvSpPr>
+          <p:nvPr>
+            <p:ph type="ftr" sz="quarter" idx="4"/>
+          </p:nvPr>
+        </p:nvSpPr>
+        <p:spPr>
+          <a:xfrm>
+            <a:off x="0" y="8685213"/>
+            <a:ext cx="2971800" cy="458787"/>
+          </a:xfrm>
+          <a:prstGeom prst="rect">
+            <a:avLst/>
+          </a:prstGeom>
+        </p:spPr>
+        <p:txBody>
+          <a:bodyPr vert="horz" lIns="91440" tIns="45720" rIns="91440" bIns="45720" rtlCol="0" anchor="b"/>
+          <a:lstStyle>
+            <a:lvl1pPr algn="l">
+              <a:defRPr sz="1200"/>
+            </a:lvl1pPr>
+          </a:lstStyle>
+          <a:p>
+            <a:endParaRPr lang="zh-CN" altLang="en-US"/>
+          </a:p>
+        </p:txBody>
+      </p:sp>
+      <p:sp>
+        <p:nvSpPr>
+          <p:cNvPr id="7" name="灯片编号占位符 6"/>
+          <p:cNvSpPr>
+            <a:spLocks noGrp="1"/>
+          </p:cNvSpPr>
+          <p:nvPr>
+            <p:ph type="sldNum" sz="quarter" idx="5"/>
+          </p:nvPr>
+        </p:nvSpPr>
+        <p:spPr>
+          <a:xfrm>
+            <a:off x="3884613" y="8685213"/>
+            <a:ext cx="2971800" cy="458787"/>
+          </a:xfrm>
+          <a:prstGeom prst="rect">
+            <a:avLst/>
+          </a:prstGeom>
+        </p:spPr>
+        <p:txBody>
+          <a:bodyPr vert="horz" lIns="91440" tIns="45720" rIns="91440" bIns="45720" rtlCol="0" anchor="b"/>
+          <a:lstStyle>
+            <a:lvl1pPr algn="r">
+              <a:defRPr sz="1200"/>
+            </a:lvl1pPr>
+          </a:lstStyle>
+          <a:p>
+            <a:fld id="{B2E4C4AA-6997-43A0-83C7-0A1A2C00A197}" type="slidenum">
+              <a:rPr lang="zh-CN" altLang="en-US" smtClean="0"/>
+              <a:t>‹#›</a:t>
+            </a:fld>
+            <a:endParaRPr lang="zh-CN" altLang="en-US"/>
+          </a:p>
+        </p:txBody>
+      </p:sp>
+    </p:spTree>
+    <p:extLst>
+      <p:ext uri="{BB962C8B-B14F-4D97-AF65-F5344CB8AC3E}">
+        <p14:creationId xmlns:p14="http://schemas.microsoft.com/office/powerpoint/2010/main" val="1154894594"/>
+      </p:ext>
+    </p:extLst>
+  </p:cSld>
+  <p:clrMap bg1="lt1" tx1="dk1" bg2="lt2" tx2="dk2" accent1="accent1" accent2="accent2" accent3="accent3" accent4="accent4" accent5="accent5" accent6="accent6" hlink="hlink" folHlink="folHlink"/>
+  <p:notesStyle>
+    <a:lvl1pPr marL="0" algn="l" defTabSz="914400" rtl="0" eaLnBrk="1" latinLnBrk="0" hangingPunct="1">
+      <a:defRPr sz="1200" kern="1200">
+        <a:solidFill>
+          <a:schemeClr val="tx1"/>
+        </a:solidFill>
+        <a:latin typeface="+mn-lt"/>
+        <a:ea typeface="+mn-ea"/>
+        <a:cs typeface="+mn-cs"/>
+      </a:defRPr>
+    </a:lvl1pPr>
+    <a:lvl2pPr marL="457200" algn="l" defTabSz="914400" rtl="0" eaLnBrk="1" latinLnBrk="0" hangingPunct="1">
+      <a:defRPr sz="1200" kern="1200">
+        <a:solidFill>
+          <a:schemeClr val="tx1"/>
+        </a:solidFill>
+        <a:latin typeface="+mn-lt"/>
+        <a:ea typeface="+mn-ea"/>
+        <a:cs typeface="+mn-cs"/>
+      </a:defRPr>
+    </a:lvl2pPr>
+    <a:lvl3pPr marL="914400" algn="l" defTabSz="914400" rtl="0" eaLnBrk="1" latinLnBrk="0" hangingPunct="1">
+      <a:defRPr sz="1200" kern="1200">
+        <a:solidFill>
+          <a:schemeClr val="tx1"/>
+        </a:solidFill>
+        <a:latin typeface="+mn-lt"/>
+        <a:ea typeface="+mn-ea"/>
+        <a:cs typeface="+mn-cs"/>
+      </a:defRPr>
+    </a:lvl3pPr>
+    <a:lvl4pPr marL="1371600" algn="l" defTabSz="914400" rtl="0" eaLnBrk="1" latinLnBrk="0" hangingPunct="1">
+      <a:defRPr sz="1200" kern="1200">
+        <a:solidFill>
+          <a:schemeClr val="tx1"/>
+        </a:solidFill>
+        <a:latin typeface="+mn-lt"/>
+        <a:ea typeface="+mn-ea"/>
+        <a:cs typeface="+mn-cs"/>
+      </a:defRPr>
+    </a:lvl4pPr>
+    <a:lvl5pPr marL="1828800" algn="l" defTabSz="914400" rtl="0" eaLnBrk="1" latinLnBrk="0" hangingPunct="1">
+      <a:defRPr sz="1200" kern="1200">
+        <a:solidFill>
+          <a:schemeClr val="tx1"/>
+        </a:solidFill>
+        <a:latin typeface="+mn-lt"/>
+        <a:ea typeface="+mn-ea"/>
+        <a:cs typeface="+mn-cs"/>
+      </a:defRPr>
+    </a:lvl5pPr>
+    <a:lvl6pPr marL="2286000" algn="l" defTabSz="914400" rtl="0" eaLnBrk="1" latinLnBrk="0" hangingPunct="1">
+      <a:defRPr sz="1200" kern="1200">
+        <a:solidFill>
+          <a:schemeClr val="tx1"/>
+        </a:solidFill>
+        <a:latin typeface="+mn-lt"/>
+        <a:ea typeface="+mn-ea"/>
+        <a:cs typeface="+mn-cs"/>
+      </a:defRPr>
+    </a:lvl6pPr>
+    <a:lvl7pPr marL="2743200" algn="l" defTabSz="914400" rtl="0" eaLnBrk="1" latinLnBrk="0" hangingPunct="1">
+      <a:defRPr sz="1200" kern="1200">
+        <a:solidFill>
+          <a:schemeClr val="tx1"/>
+        </a:solidFill>
+        <a:latin typeface="+mn-lt"/>
+        <a:ea typeface="+mn-ea"/>
+        <a:cs typeface="+mn-cs"/>
+      </a:defRPr>
+    </a:lvl7pPr>
+    <a:lvl8pPr marL="3200400" algn="l" defTabSz="914400" rtl="0" eaLnBrk="1" latinLnBrk="0" hangingPunct="1">
+      <a:defRPr sz="1200" kern="1200">
+        <a:solidFill>
+          <a:schemeClr val="tx1"/>
+        </a:solidFill>
+        <a:latin typeface="+mn-lt"/>
+        <a:ea typeface="+mn-ea"/>
+        <a:cs typeface="+mn-cs"/>
+      </a:defRPr>
+    </a:lvl8pPr>
+    <a:lvl9pPr marL="3657600" algn="l" defTabSz="914400" rtl="0" eaLnBrk="1" latinLnBrk="0" hangingPunct="1">
+      <a:defRPr sz="1200" kern="1200">
+        <a:solidFill>
+          <a:schemeClr val="tx1"/>
+        </a:solidFill>
+        <a:latin typeface="+mn-lt"/>
+        <a:ea typeface="+mn-ea"/>
+        <a:cs typeface="+mn-cs"/>
+      </a:defRPr>
+    </a:lvl9pPr>
+  </p:notesStyle>
+</p:notesMaster>
+</file>
+
+<file path=ppt/notesSlides/notesSlide1.xml><?xml version="1.0" encoding="utf-8"?>
+<p:notes xmlns:a="http://schemas.openxmlformats.org/drawingml/2006/main" xmlns:r="http://schemas.openxmlformats.org/officeDocument/2006/relationships" xmlns:p="http://schemas.openxmlformats.org/presentationml/2006/main">
+  <p:cSld>
+    <p:spTree>
+      <p:nvGrpSpPr>
+        <p:cNvPr id="1" name=""/>
+        <p:cNvGrpSpPr/>
+        <p:nvPr/>
+      </p:nvGrpSpPr>
+      <p:grpSpPr>
+        <a:xfrm>
+          <a:off x="0" y="0"/>
+          <a:ext cx="0" cy="0"/>
+          <a:chOff x="0" y="0"/>
+          <a:chExt cx="0" cy="0"/>
+        </a:xfrm>
+      </p:grpSpPr>
+      <p:sp>
+        <p:nvSpPr>
+          <p:cNvPr id="2" name="幻灯片图像占位符 1"/>
+          <p:cNvSpPr>
+            <a:spLocks noGrp="1" noRot="1" noChangeAspect="1"/>
+          </p:cNvSpPr>
+          <p:nvPr>
+            <p:ph type="sldImg"/>
+          </p:nvPr>
+        </p:nvSpPr>
+        <p:spPr/>
+      </p:sp>
+      <p:sp>
+        <p:nvSpPr>
+          <p:cNvPr id="3" name="备注占位符 2"/>
+          <p:cNvSpPr>
+            <a:spLocks noGrp="1"/>
+          </p:cNvSpPr>
+          <p:nvPr>
+            <p:ph type="body" idx="1"/>
+          </p:nvPr>
+        </p:nvSpPr>
+        <p:spPr/>
+        <p:txBody>
+          <a:bodyPr/>
+          <a:lstStyle/>
+          <a:p>
+            <a:endParaRPr lang="zh-CN" altLang="en-US" dirty="0"/>
+          </a:p>
+        </p:txBody>
+      </p:sp>
+      <p:sp>
+        <p:nvSpPr>
+          <p:cNvPr id="4" name="灯片编号占位符 3"/>
+          <p:cNvSpPr>
+            <a:spLocks noGrp="1"/>
+          </p:cNvSpPr>
+          <p:nvPr>
+            <p:ph type="sldNum" sz="quarter" idx="10"/>
+          </p:nvPr>
+        </p:nvSpPr>
+        <p:spPr/>
+        <p:txBody>
+          <a:bodyPr/>
+          <a:lstStyle/>
+          <a:p>
+            <a:fld id="{B2E4C4AA-6997-43A0-83C7-0A1A2C00A197}" type="slidenum">
+              <a:rPr lang="zh-CN" altLang="en-US" smtClean="0"/>
+              <a:t>6</a:t>
+            </a:fld>
+            <a:endParaRPr lang="zh-CN" altLang="en-US"/>
+          </a:p>
+        </p:txBody>
+      </p:sp>
+    </p:spTree>
+    <p:extLst>
+      <p:ext uri="{BB962C8B-B14F-4D97-AF65-F5344CB8AC3E}">
+        <p14:creationId xmlns:p14="http://schemas.microsoft.com/office/powerpoint/2010/main" val="3198445050"/>
+      </p:ext>
+    </p:extLst>
+  </p:cSld>
+  <p:clrMapOvr>
+    <a:masterClrMapping/>
+  </p:clrMapOvr>
+</p:notes>
 </file>
 
 <file path=ppt/slideLayouts/slideLayout1.xml><?xml version="1.0" encoding="utf-8"?>
@@ -3329,144 +3768,145 @@
           <a:chExt cx="0" cy="0"/>
         </a:xfrm>
       </p:grpSpPr>
+      <p:sp>
+        <p:nvSpPr>
+          <p:cNvPr id="2" name="文本框 1"/>
+          <p:cNvSpPr txBox="1"/>
+          <p:nvPr/>
+        </p:nvSpPr>
+        <p:spPr>
+          <a:xfrm>
+            <a:off x="353961" y="790512"/>
+            <a:ext cx="2583918" cy="369332"/>
+          </a:xfrm>
+          <a:prstGeom prst="rect">
+            <a:avLst/>
+          </a:prstGeom>
+          <a:noFill/>
+        </p:spPr>
+        <p:txBody>
+          <a:bodyPr wrap="square" rtlCol="0">
+            <a:spAutoFit/>
+          </a:bodyPr>
+          <a:lstStyle/>
+          <a:p>
+            <a:r>
+              <a:rPr lang="en-US" altLang="zh-CN" dirty="0" smtClean="0"/>
+              <a:t>Network Architecture:</a:t>
+            </a:r>
+            <a:endParaRPr lang="zh-CN" altLang="en-US" dirty="0"/>
+          </a:p>
+        </p:txBody>
+      </p:sp>
       <p:pic>
         <p:nvPicPr>
-          <p:cNvPr id="5" name="图片 4">
-            <a:extLst>
-              <a:ext uri="{FF2B5EF4-FFF2-40B4-BE49-F238E27FC236}">
-                <a16:creationId xmlns:a16="http://schemas.microsoft.com/office/drawing/2014/main" id="{61DB2AD8-8101-4114-BAB7-70AA45A33999}"/>
-              </a:ext>
-            </a:extLst>
-          </p:cNvPr>
+          <p:cNvPr id="3" name="图片 2"/>
           <p:cNvPicPr>
             <a:picLocks noChangeAspect="1"/>
           </p:cNvPicPr>
           <p:nvPr/>
         </p:nvPicPr>
         <p:blipFill>
-          <a:blip r:embed="rId2">
-            <a:extLst>
-              <a:ext uri="{28A0092B-C50C-407E-A947-70E740481C1C}">
-                <a14:useLocalDpi xmlns:a14="http://schemas.microsoft.com/office/drawing/2010/main" val="0"/>
-              </a:ext>
-            </a:extLst>
-          </a:blip>
+          <a:blip r:embed="rId2"/>
           <a:stretch>
             <a:fillRect/>
           </a:stretch>
         </p:blipFill>
         <p:spPr>
           <a:xfrm>
-            <a:off x="550304" y="121597"/>
-            <a:ext cx="3955200" cy="2966400"/>
+            <a:off x="300866" y="1233990"/>
+            <a:ext cx="4906397" cy="4224835"/>
           </a:xfrm>
           <a:prstGeom prst="rect">
             <a:avLst/>
           </a:prstGeom>
         </p:spPr>
       </p:pic>
+      <p:cxnSp>
+        <p:nvCxnSpPr>
+          <p:cNvPr id="5" name="直接箭头连接符 4"/>
+          <p:cNvCxnSpPr/>
+          <p:nvPr/>
+        </p:nvCxnSpPr>
+        <p:spPr>
+          <a:xfrm>
+            <a:off x="4971289" y="3224306"/>
+            <a:ext cx="1417712" cy="0"/>
+          </a:xfrm>
+          <a:prstGeom prst="straightConnector1">
+            <a:avLst/>
+          </a:prstGeom>
+          <a:ln w="19050">
+            <a:tailEnd type="triangle"/>
+          </a:ln>
+        </p:spPr>
+        <p:style>
+          <a:lnRef idx="1">
+            <a:schemeClr val="dk1"/>
+          </a:lnRef>
+          <a:fillRef idx="0">
+            <a:schemeClr val="dk1"/>
+          </a:fillRef>
+          <a:effectRef idx="0">
+            <a:schemeClr val="dk1"/>
+          </a:effectRef>
+          <a:fontRef idx="minor">
+            <a:schemeClr val="tx1"/>
+          </a:fontRef>
+        </p:style>
+      </p:cxnSp>
+      <p:sp>
+        <p:nvSpPr>
+          <p:cNvPr id="7" name="文本框 6"/>
+          <p:cNvSpPr txBox="1"/>
+          <p:nvPr/>
+        </p:nvSpPr>
+        <p:spPr>
+          <a:xfrm>
+            <a:off x="4927375" y="2854974"/>
+            <a:ext cx="1505540" cy="369332"/>
+          </a:xfrm>
+          <a:prstGeom prst="rect">
+            <a:avLst/>
+          </a:prstGeom>
+          <a:noFill/>
+        </p:spPr>
+        <p:txBody>
+          <a:bodyPr wrap="none" rtlCol="0">
+            <a:spAutoFit/>
+          </a:bodyPr>
+          <a:lstStyle/>
+          <a:p>
+            <a:r>
+              <a:rPr lang="en-US" altLang="zh-CN" dirty="0" smtClean="0"/>
+              <a:t>Guided </a:t>
+            </a:r>
+            <a:r>
+              <a:rPr lang="en-US" altLang="zh-CN" dirty="0" err="1" smtClean="0"/>
+              <a:t>Atten</a:t>
+            </a:r>
+            <a:endParaRPr lang="zh-CN" altLang="en-US" dirty="0"/>
+          </a:p>
+        </p:txBody>
+      </p:sp>
       <p:pic>
         <p:nvPicPr>
-          <p:cNvPr id="7" name="图片 6">
-            <a:extLst>
-              <a:ext uri="{FF2B5EF4-FFF2-40B4-BE49-F238E27FC236}">
-                <a16:creationId xmlns:a16="http://schemas.microsoft.com/office/drawing/2014/main" id="{517692A5-FAC4-4EC5-B28A-45DA63A61771}"/>
-              </a:ext>
-            </a:extLst>
-          </p:cNvPr>
+          <p:cNvPr id="8" name="图片 7"/>
           <p:cNvPicPr>
             <a:picLocks noChangeAspect="1"/>
           </p:cNvPicPr>
           <p:nvPr/>
         </p:nvPicPr>
         <p:blipFill>
-          <a:blip r:embed="rId3">
-            <a:extLst>
-              <a:ext uri="{28A0092B-C50C-407E-A947-70E740481C1C}">
-                <a14:useLocalDpi xmlns:a14="http://schemas.microsoft.com/office/drawing/2010/main" val="0"/>
-              </a:ext>
-            </a:extLst>
-          </a:blip>
+          <a:blip r:embed="rId3"/>
           <a:stretch>
             <a:fillRect/>
           </a:stretch>
         </p:blipFill>
         <p:spPr>
           <a:xfrm>
-            <a:off x="4392599" y="195489"/>
-            <a:ext cx="3955200" cy="2966400"/>
-          </a:xfrm>
-          <a:prstGeom prst="rect">
-            <a:avLst/>
-          </a:prstGeom>
-        </p:spPr>
-      </p:pic>
-      <p:pic>
-        <p:nvPicPr>
-          <p:cNvPr id="9" name="图片 8">
-            <a:extLst>
-              <a:ext uri="{FF2B5EF4-FFF2-40B4-BE49-F238E27FC236}">
-                <a16:creationId xmlns:a16="http://schemas.microsoft.com/office/drawing/2014/main" id="{0A3C8229-F2B6-47BA-99DC-43DF718899FA}"/>
-              </a:ext>
-            </a:extLst>
-          </p:cNvPr>
-          <p:cNvPicPr>
-            <a:picLocks noChangeAspect="1"/>
-          </p:cNvPicPr>
-          <p:nvPr/>
-        </p:nvPicPr>
-        <p:blipFill>
-          <a:blip r:embed="rId4">
-            <a:extLst>
-              <a:ext uri="{28A0092B-C50C-407E-A947-70E740481C1C}">
-                <a14:useLocalDpi xmlns:a14="http://schemas.microsoft.com/office/drawing/2010/main" val="0"/>
-              </a:ext>
-            </a:extLst>
-          </a:blip>
-          <a:stretch>
-            <a:fillRect/>
-          </a:stretch>
-        </p:blipFill>
-        <p:spPr>
-          <a:xfrm>
-            <a:off x="8234894" y="121598"/>
-            <a:ext cx="3955200" cy="2966400"/>
-          </a:xfrm>
-          <a:prstGeom prst="rect">
-            <a:avLst/>
-          </a:prstGeom>
-        </p:spPr>
-      </p:pic>
-      <p:pic>
-        <p:nvPicPr>
-          <p:cNvPr id="11" name="图片 10">
-            <a:extLst>
-              <a:ext uri="{FF2B5EF4-FFF2-40B4-BE49-F238E27FC236}">
-                <a16:creationId xmlns:a16="http://schemas.microsoft.com/office/drawing/2014/main" id="{0A821CF9-CBC2-41FC-B345-0BC7F667EE6A}"/>
-              </a:ext>
-            </a:extLst>
-          </p:cNvPr>
-          <p:cNvPicPr>
-            <a:picLocks noChangeAspect="1"/>
-          </p:cNvPicPr>
-          <p:nvPr/>
-        </p:nvPicPr>
-        <p:blipFill>
-          <a:blip r:embed="rId5">
-            <a:extLst>
-              <a:ext uri="{28A0092B-C50C-407E-A947-70E740481C1C}">
-                <a14:useLocalDpi xmlns:a14="http://schemas.microsoft.com/office/drawing/2010/main" val="0"/>
-              </a:ext>
-            </a:extLst>
-          </a:blip>
-          <a:stretch>
-            <a:fillRect/>
-          </a:stretch>
-        </p:blipFill>
-        <p:spPr>
-          <a:xfrm>
-            <a:off x="4355686" y="3768572"/>
-            <a:ext cx="3957108" cy="2967831"/>
+            <a:off x="6527305" y="1863299"/>
+            <a:ext cx="4944497" cy="2722013"/>
           </a:xfrm>
           <a:prstGeom prst="rect">
             <a:avLst/>
@@ -3476,7 +3916,7 @@
     </p:spTree>
     <p:extLst>
       <p:ext uri="{BB962C8B-B14F-4D97-AF65-F5344CB8AC3E}">
-        <p14:creationId xmlns:p14="http://schemas.microsoft.com/office/powerpoint/2010/main" val="3487594004"/>
+        <p14:creationId xmlns:p14="http://schemas.microsoft.com/office/powerpoint/2010/main" val="2411339649"/>
       </p:ext>
     </p:extLst>
   </p:cSld>
@@ -3510,15 +3950,43 @@
           <a:chExt cx="0" cy="0"/>
         </a:xfrm>
       </p:grpSpPr>
+      <p:sp>
+        <p:nvSpPr>
+          <p:cNvPr id="3" name="文本框 2"/>
+          <p:cNvSpPr txBox="1"/>
+          <p:nvPr/>
+        </p:nvSpPr>
+        <p:spPr>
+          <a:xfrm>
+            <a:off x="353960" y="790513"/>
+            <a:ext cx="3834581" cy="369332"/>
+          </a:xfrm>
+          <a:prstGeom prst="rect">
+            <a:avLst/>
+          </a:prstGeom>
+          <a:noFill/>
+        </p:spPr>
+        <p:txBody>
+          <a:bodyPr wrap="square" rtlCol="0">
+            <a:spAutoFit/>
+          </a:bodyPr>
+          <a:lstStyle/>
+          <a:p>
+            <a:r>
+              <a:rPr lang="en-US" altLang="zh-CN" dirty="0" err="1" smtClean="0"/>
+              <a:t>Position&amp;Channel</a:t>
+            </a:r>
+            <a:r>
+              <a:rPr lang="en-US" altLang="zh-CN" dirty="0" smtClean="0"/>
+              <a:t> Attention Module:</a:t>
+            </a:r>
+            <a:endParaRPr lang="zh-CN" altLang="en-US" dirty="0"/>
+          </a:p>
+        </p:txBody>
+      </p:sp>
       <p:pic>
         <p:nvPicPr>
-          <p:cNvPr id="5" name="图片 4">
-            <a:extLst>
-              <a:ext uri="{FF2B5EF4-FFF2-40B4-BE49-F238E27FC236}">
-                <a16:creationId xmlns:a16="http://schemas.microsoft.com/office/drawing/2014/main" id="{4C79DFA7-9030-4F59-BF7C-C35829BBAC2A}"/>
-              </a:ext>
-            </a:extLst>
-          </p:cNvPr>
+          <p:cNvPr id="10" name="图片 9"/>
           <p:cNvPicPr>
             <a:picLocks noChangeAspect="1"/>
           </p:cNvPicPr>
@@ -3532,158 +4000,8 @@
         </p:blipFill>
         <p:spPr>
           <a:xfrm>
-            <a:off x="838200" y="365125"/>
-            <a:ext cx="4080000" cy="3060000"/>
-          </a:xfrm>
-          <a:prstGeom prst="rect">
-            <a:avLst/>
-          </a:prstGeom>
-        </p:spPr>
-      </p:pic>
-      <p:pic>
-        <p:nvPicPr>
-          <p:cNvPr id="7" name="图片 6">
-            <a:extLst>
-              <a:ext uri="{FF2B5EF4-FFF2-40B4-BE49-F238E27FC236}">
-                <a16:creationId xmlns:a16="http://schemas.microsoft.com/office/drawing/2014/main" id="{E809C663-C513-4746-A94A-679BDF2F0477}"/>
-              </a:ext>
-            </a:extLst>
-          </p:cNvPr>
-          <p:cNvPicPr>
-            <a:picLocks noChangeAspect="1"/>
-          </p:cNvPicPr>
-          <p:nvPr/>
-        </p:nvPicPr>
-        <p:blipFill>
-          <a:blip r:embed="rId3"/>
-          <a:stretch>
-            <a:fillRect/>
-          </a:stretch>
-        </p:blipFill>
-        <p:spPr>
-          <a:xfrm>
-            <a:off x="3999345" y="365125"/>
-            <a:ext cx="4080000" cy="3060000"/>
-          </a:xfrm>
-          <a:prstGeom prst="rect">
-            <a:avLst/>
-          </a:prstGeom>
-        </p:spPr>
-      </p:pic>
-      <p:pic>
-        <p:nvPicPr>
-          <p:cNvPr id="9" name="图片 8">
-            <a:extLst>
-              <a:ext uri="{FF2B5EF4-FFF2-40B4-BE49-F238E27FC236}">
-                <a16:creationId xmlns:a16="http://schemas.microsoft.com/office/drawing/2014/main" id="{E3B8789C-C07A-42B4-8898-508F5BC43C9A}"/>
-              </a:ext>
-            </a:extLst>
-          </p:cNvPr>
-          <p:cNvPicPr>
-            <a:picLocks noChangeAspect="1"/>
-          </p:cNvPicPr>
-          <p:nvPr/>
-        </p:nvPicPr>
-        <p:blipFill>
-          <a:blip r:embed="rId4"/>
-          <a:stretch>
-            <a:fillRect/>
-          </a:stretch>
-        </p:blipFill>
-        <p:spPr>
-          <a:xfrm>
-            <a:off x="7421255" y="365125"/>
-            <a:ext cx="4080000" cy="3060000"/>
-          </a:xfrm>
-          <a:prstGeom prst="rect">
-            <a:avLst/>
-          </a:prstGeom>
-        </p:spPr>
-      </p:pic>
-      <p:pic>
-        <p:nvPicPr>
-          <p:cNvPr id="11" name="图片 10">
-            <a:extLst>
-              <a:ext uri="{FF2B5EF4-FFF2-40B4-BE49-F238E27FC236}">
-                <a16:creationId xmlns:a16="http://schemas.microsoft.com/office/drawing/2014/main" id="{87DA8682-09AE-4C5E-ADD5-174A792C9975}"/>
-              </a:ext>
-            </a:extLst>
-          </p:cNvPr>
-          <p:cNvPicPr>
-            <a:picLocks noChangeAspect="1"/>
-          </p:cNvPicPr>
-          <p:nvPr/>
-        </p:nvPicPr>
-        <p:blipFill>
-          <a:blip r:embed="rId5"/>
-          <a:stretch>
-            <a:fillRect/>
-          </a:stretch>
-        </p:blipFill>
-        <p:spPr>
-          <a:xfrm>
-            <a:off x="838201" y="3580366"/>
-            <a:ext cx="4079999" cy="3060000"/>
-          </a:xfrm>
-          <a:prstGeom prst="rect">
-            <a:avLst/>
-          </a:prstGeom>
-        </p:spPr>
-      </p:pic>
-      <p:pic>
-        <p:nvPicPr>
-          <p:cNvPr id="13" name="图片 12">
-            <a:extLst>
-              <a:ext uri="{FF2B5EF4-FFF2-40B4-BE49-F238E27FC236}">
-                <a16:creationId xmlns:a16="http://schemas.microsoft.com/office/drawing/2014/main" id="{879D0710-7A9A-4ED4-99E1-1DC885A14844}"/>
-              </a:ext>
-            </a:extLst>
-          </p:cNvPr>
-          <p:cNvPicPr>
-            <a:picLocks noChangeAspect="1"/>
-          </p:cNvPicPr>
-          <p:nvPr/>
-        </p:nvPicPr>
-        <p:blipFill>
-          <a:blip r:embed="rId6"/>
-          <a:stretch>
-            <a:fillRect/>
-          </a:stretch>
-        </p:blipFill>
-        <p:spPr>
-          <a:xfrm>
-            <a:off x="3999345" y="3580366"/>
-            <a:ext cx="4080000" cy="3060000"/>
-          </a:xfrm>
-          <a:prstGeom prst="rect">
-            <a:avLst/>
-          </a:prstGeom>
-        </p:spPr>
-      </p:pic>
-      <p:pic>
-        <p:nvPicPr>
-          <p:cNvPr id="15" name="图片 14">
-            <a:extLst>
-              <a:ext uri="{FF2B5EF4-FFF2-40B4-BE49-F238E27FC236}">
-                <a16:creationId xmlns:a16="http://schemas.microsoft.com/office/drawing/2014/main" id="{CCC4BFC9-DC80-42A8-9B51-6223AC0D4B3D}"/>
-              </a:ext>
-            </a:extLst>
-          </p:cNvPr>
-          <p:cNvPicPr>
-            <a:picLocks noChangeAspect="1"/>
-          </p:cNvPicPr>
-          <p:nvPr/>
-        </p:nvPicPr>
-        <p:blipFill>
-          <a:blip r:embed="rId7"/>
-          <a:stretch>
-            <a:fillRect/>
-          </a:stretch>
-        </p:blipFill>
-        <p:spPr>
-          <a:xfrm>
-            <a:off x="7421255" y="3580366"/>
-            <a:ext cx="4080000" cy="3060000"/>
+            <a:off x="2531144" y="1189341"/>
+            <a:ext cx="5477893" cy="5710724"/>
           </a:xfrm>
           <a:prstGeom prst="rect">
             <a:avLst/>
@@ -3693,7 +4011,7 @@
     </p:spTree>
     <p:extLst>
       <p:ext uri="{BB962C8B-B14F-4D97-AF65-F5344CB8AC3E}">
-        <p14:creationId xmlns:p14="http://schemas.microsoft.com/office/powerpoint/2010/main" val="3121898424"/>
+        <p14:creationId xmlns:p14="http://schemas.microsoft.com/office/powerpoint/2010/main" val="3459960175"/>
       </p:ext>
     </p:extLst>
   </p:cSld>
@@ -3732,7 +4050,7 @@
           <p:cNvPr id="5" name="图片 4">
             <a:extLst>
               <a:ext uri="{FF2B5EF4-FFF2-40B4-BE49-F238E27FC236}">
-                <a16:creationId xmlns:a16="http://schemas.microsoft.com/office/drawing/2014/main" id="{B31BBDC7-17A8-45E2-8580-ADFB61FC8CE3}"/>
+                <a16:creationId xmlns:a16="http://schemas.microsoft.com/office/drawing/2014/main" id="{61DB2AD8-8101-4114-BAB7-70AA45A33999}"/>
               </a:ext>
             </a:extLst>
           </p:cNvPr>
@@ -3742,15 +4060,21 @@
           <p:nvPr/>
         </p:nvPicPr>
         <p:blipFill>
-          <a:blip r:embed="rId2"/>
+          <a:blip r:embed="rId2">
+            <a:extLst>
+              <a:ext uri="{28A0092B-C50C-407E-A947-70E740481C1C}">
+                <a14:useLocalDpi xmlns:a14="http://schemas.microsoft.com/office/drawing/2010/main" val="0"/>
+              </a:ext>
+            </a:extLst>
+          </a:blip>
           <a:stretch>
             <a:fillRect/>
           </a:stretch>
         </p:blipFill>
         <p:spPr>
           <a:xfrm>
-            <a:off x="757382" y="477983"/>
-            <a:ext cx="4080000" cy="3060000"/>
+            <a:off x="550304" y="92101"/>
+            <a:ext cx="3955200" cy="2966400"/>
           </a:xfrm>
           <a:prstGeom prst="rect">
             <a:avLst/>
@@ -3762,7 +4086,7 @@
           <p:cNvPr id="7" name="图片 6">
             <a:extLst>
               <a:ext uri="{FF2B5EF4-FFF2-40B4-BE49-F238E27FC236}">
-                <a16:creationId xmlns:a16="http://schemas.microsoft.com/office/drawing/2014/main" id="{70EE4359-D9FE-4638-AB0B-B6D88F00D783}"/>
+                <a16:creationId xmlns:a16="http://schemas.microsoft.com/office/drawing/2014/main" id="{517692A5-FAC4-4EC5-B28A-45DA63A61771}"/>
               </a:ext>
             </a:extLst>
           </p:cNvPr>
@@ -3772,15 +4096,21 @@
           <p:nvPr/>
         </p:nvPicPr>
         <p:blipFill>
-          <a:blip r:embed="rId3"/>
+          <a:blip r:embed="rId3">
+            <a:extLst>
+              <a:ext uri="{28A0092B-C50C-407E-A947-70E740481C1C}">
+                <a14:useLocalDpi xmlns:a14="http://schemas.microsoft.com/office/drawing/2010/main" val="0"/>
+              </a:ext>
+            </a:extLst>
+          </a:blip>
           <a:stretch>
             <a:fillRect/>
           </a:stretch>
         </p:blipFill>
         <p:spPr>
           <a:xfrm>
-            <a:off x="3990109" y="477983"/>
-            <a:ext cx="4080000" cy="3060000"/>
+            <a:off x="4392599" y="195489"/>
+            <a:ext cx="3955200" cy="2966400"/>
           </a:xfrm>
           <a:prstGeom prst="rect">
             <a:avLst/>
@@ -3792,7 +4122,7 @@
           <p:cNvPr id="9" name="图片 8">
             <a:extLst>
               <a:ext uri="{FF2B5EF4-FFF2-40B4-BE49-F238E27FC236}">
-                <a16:creationId xmlns:a16="http://schemas.microsoft.com/office/drawing/2014/main" id="{5BEC64BC-92E5-4515-AB38-7F90D3FBE535}"/>
+                <a16:creationId xmlns:a16="http://schemas.microsoft.com/office/drawing/2014/main" id="{0A3C8229-F2B6-47BA-99DC-43DF718899FA}"/>
               </a:ext>
             </a:extLst>
           </p:cNvPr>
@@ -3802,15 +4132,21 @@
           <p:nvPr/>
         </p:nvPicPr>
         <p:blipFill>
-          <a:blip r:embed="rId4"/>
+          <a:blip r:embed="rId4">
+            <a:extLst>
+              <a:ext uri="{28A0092B-C50C-407E-A947-70E740481C1C}">
+                <a14:useLocalDpi xmlns:a14="http://schemas.microsoft.com/office/drawing/2010/main" val="0"/>
+              </a:ext>
+            </a:extLst>
+          </a:blip>
           <a:stretch>
             <a:fillRect/>
           </a:stretch>
         </p:blipFill>
         <p:spPr>
           <a:xfrm>
-            <a:off x="7222836" y="477983"/>
-            <a:ext cx="4080000" cy="3060000"/>
+            <a:off x="8234894" y="121598"/>
+            <a:ext cx="3955200" cy="2966400"/>
           </a:xfrm>
           <a:prstGeom prst="rect">
             <a:avLst/>
@@ -3822,7 +4158,7 @@
           <p:cNvPr id="11" name="图片 10">
             <a:extLst>
               <a:ext uri="{FF2B5EF4-FFF2-40B4-BE49-F238E27FC236}">
-                <a16:creationId xmlns:a16="http://schemas.microsoft.com/office/drawing/2014/main" id="{8E8E7332-91BE-4E61-8413-27D0978F6AFC}"/>
+                <a16:creationId xmlns:a16="http://schemas.microsoft.com/office/drawing/2014/main" id="{0A821CF9-CBC2-41FC-B345-0BC7F667EE6A}"/>
               </a:ext>
             </a:extLst>
           </p:cNvPr>
@@ -3832,75 +4168,21 @@
           <p:nvPr/>
         </p:nvPicPr>
         <p:blipFill>
-          <a:blip r:embed="rId5"/>
+          <a:blip r:embed="rId5">
+            <a:extLst>
+              <a:ext uri="{28A0092B-C50C-407E-A947-70E740481C1C}">
+                <a14:useLocalDpi xmlns:a14="http://schemas.microsoft.com/office/drawing/2010/main" val="0"/>
+              </a:ext>
+            </a:extLst>
+          </a:blip>
           <a:stretch>
             <a:fillRect/>
           </a:stretch>
         </p:blipFill>
         <p:spPr>
           <a:xfrm>
-            <a:off x="757382" y="3798000"/>
-            <a:ext cx="4080000" cy="3060000"/>
-          </a:xfrm>
-          <a:prstGeom prst="rect">
-            <a:avLst/>
-          </a:prstGeom>
-        </p:spPr>
-      </p:pic>
-      <p:pic>
-        <p:nvPicPr>
-          <p:cNvPr id="13" name="图片 12">
-            <a:extLst>
-              <a:ext uri="{FF2B5EF4-FFF2-40B4-BE49-F238E27FC236}">
-                <a16:creationId xmlns:a16="http://schemas.microsoft.com/office/drawing/2014/main" id="{B7B12158-ED88-4070-A9CF-AE3D10F49379}"/>
-              </a:ext>
-            </a:extLst>
-          </p:cNvPr>
-          <p:cNvPicPr>
-            <a:picLocks noChangeAspect="1"/>
-          </p:cNvPicPr>
-          <p:nvPr/>
-        </p:nvPicPr>
-        <p:blipFill>
-          <a:blip r:embed="rId6"/>
-          <a:stretch>
-            <a:fillRect/>
-          </a:stretch>
-        </p:blipFill>
-        <p:spPr>
-          <a:xfrm>
-            <a:off x="3990108" y="3804472"/>
-            <a:ext cx="4080000" cy="3060000"/>
-          </a:xfrm>
-          <a:prstGeom prst="rect">
-            <a:avLst/>
-          </a:prstGeom>
-        </p:spPr>
-      </p:pic>
-      <p:pic>
-        <p:nvPicPr>
-          <p:cNvPr id="15" name="图片 14">
-            <a:extLst>
-              <a:ext uri="{FF2B5EF4-FFF2-40B4-BE49-F238E27FC236}">
-                <a16:creationId xmlns:a16="http://schemas.microsoft.com/office/drawing/2014/main" id="{42AD7286-CF4A-4E47-A225-9C377848C197}"/>
-              </a:ext>
-            </a:extLst>
-          </p:cNvPr>
-          <p:cNvPicPr>
-            <a:picLocks noChangeAspect="1"/>
-          </p:cNvPicPr>
-          <p:nvPr/>
-        </p:nvPicPr>
-        <p:blipFill>
-          <a:blip r:embed="rId7"/>
-          <a:stretch>
-            <a:fillRect/>
-          </a:stretch>
-        </p:blipFill>
-        <p:spPr>
-          <a:xfrm>
-            <a:off x="7222834" y="3798000"/>
-            <a:ext cx="4080000" cy="3060000"/>
+            <a:off x="4390691" y="3798069"/>
+            <a:ext cx="3957108" cy="2967831"/>
           </a:xfrm>
           <a:prstGeom prst="rect">
             <a:avLst/>
@@ -3910,7 +4192,7 @@
     </p:spTree>
     <p:extLst>
       <p:ext uri="{BB962C8B-B14F-4D97-AF65-F5344CB8AC3E}">
-        <p14:creationId xmlns:p14="http://schemas.microsoft.com/office/powerpoint/2010/main" val="535985543"/>
+        <p14:creationId xmlns:p14="http://schemas.microsoft.com/office/powerpoint/2010/main" val="3487594004"/>
       </p:ext>
     </p:extLst>
   </p:cSld>
@@ -3946,7 +4228,13 @@
       </p:grpSpPr>
       <p:pic>
         <p:nvPicPr>
-          <p:cNvPr id="2" name="图片 1"/>
+          <p:cNvPr id="5" name="图片 4">
+            <a:extLst>
+              <a:ext uri="{FF2B5EF4-FFF2-40B4-BE49-F238E27FC236}">
+                <a16:creationId xmlns:a16="http://schemas.microsoft.com/office/drawing/2014/main" id="{4C79DFA7-9030-4F59-BF7C-C35829BBAC2A}"/>
+              </a:ext>
+            </a:extLst>
+          </p:cNvPr>
           <p:cNvPicPr>
             <a:picLocks noChangeAspect="1"/>
           </p:cNvPicPr>
@@ -3960,8 +4248,8 @@
         </p:blipFill>
         <p:spPr>
           <a:xfrm>
-            <a:off x="228107" y="-703498"/>
-            <a:ext cx="3966333" cy="2974750"/>
+            <a:off x="838200" y="365125"/>
+            <a:ext cx="4080000" cy="3060000"/>
           </a:xfrm>
           <a:prstGeom prst="rect">
             <a:avLst/>
@@ -3970,7 +4258,13 @@
       </p:pic>
       <p:pic>
         <p:nvPicPr>
-          <p:cNvPr id="3" name="图片 2"/>
+          <p:cNvPr id="7" name="图片 6">
+            <a:extLst>
+              <a:ext uri="{FF2B5EF4-FFF2-40B4-BE49-F238E27FC236}">
+                <a16:creationId xmlns:a16="http://schemas.microsoft.com/office/drawing/2014/main" id="{E809C663-C513-4746-A94A-679BDF2F0477}"/>
+              </a:ext>
+            </a:extLst>
+          </p:cNvPr>
           <p:cNvPicPr>
             <a:picLocks noChangeAspect="1"/>
           </p:cNvPicPr>
@@ -3984,8 +4278,8 @@
         </p:blipFill>
         <p:spPr>
           <a:xfrm>
-            <a:off x="4194440" y="-703498"/>
-            <a:ext cx="3964800" cy="2973600"/>
+            <a:off x="3999345" y="365125"/>
+            <a:ext cx="4080000" cy="3060000"/>
           </a:xfrm>
           <a:prstGeom prst="rect">
             <a:avLst/>
@@ -3994,7 +4288,13 @@
       </p:pic>
       <p:pic>
         <p:nvPicPr>
-          <p:cNvPr id="4" name="图片 3"/>
+          <p:cNvPr id="9" name="图片 8">
+            <a:extLst>
+              <a:ext uri="{FF2B5EF4-FFF2-40B4-BE49-F238E27FC236}">
+                <a16:creationId xmlns:a16="http://schemas.microsoft.com/office/drawing/2014/main" id="{E3B8789C-C07A-42B4-8898-508F5BC43C9A}"/>
+              </a:ext>
+            </a:extLst>
+          </p:cNvPr>
           <p:cNvPicPr>
             <a:picLocks noChangeAspect="1"/>
           </p:cNvPicPr>
@@ -4008,8 +4308,8 @@
         </p:blipFill>
         <p:spPr>
           <a:xfrm>
-            <a:off x="8159240" y="-703498"/>
-            <a:ext cx="3964800" cy="2973600"/>
+            <a:off x="7421255" y="365125"/>
+            <a:ext cx="4080000" cy="3060000"/>
           </a:xfrm>
           <a:prstGeom prst="rect">
             <a:avLst/>
@@ -4018,7 +4318,13 @@
       </p:pic>
       <p:pic>
         <p:nvPicPr>
-          <p:cNvPr id="5" name="图片 4"/>
+          <p:cNvPr id="11" name="图片 10">
+            <a:extLst>
+              <a:ext uri="{FF2B5EF4-FFF2-40B4-BE49-F238E27FC236}">
+                <a16:creationId xmlns:a16="http://schemas.microsoft.com/office/drawing/2014/main" id="{87DA8682-09AE-4C5E-ADD5-174A792C9975}"/>
+              </a:ext>
+            </a:extLst>
+          </p:cNvPr>
           <p:cNvPicPr>
             <a:picLocks noChangeAspect="1"/>
           </p:cNvPicPr>
@@ -4032,8 +4338,8 @@
         </p:blipFill>
         <p:spPr>
           <a:xfrm>
-            <a:off x="229640" y="1467465"/>
-            <a:ext cx="3964800" cy="2973600"/>
+            <a:off x="838201" y="3580366"/>
+            <a:ext cx="4079999" cy="3060000"/>
           </a:xfrm>
           <a:prstGeom prst="rect">
             <a:avLst/>
@@ -4042,7 +4348,13 @@
       </p:pic>
       <p:pic>
         <p:nvPicPr>
-          <p:cNvPr id="6" name="图片 5"/>
+          <p:cNvPr id="13" name="图片 12">
+            <a:extLst>
+              <a:ext uri="{FF2B5EF4-FFF2-40B4-BE49-F238E27FC236}">
+                <a16:creationId xmlns:a16="http://schemas.microsoft.com/office/drawing/2014/main" id="{879D0710-7A9A-4ED4-99E1-1DC885A14844}"/>
+              </a:ext>
+            </a:extLst>
+          </p:cNvPr>
           <p:cNvPicPr>
             <a:picLocks noChangeAspect="1"/>
           </p:cNvPicPr>
@@ -4056,8 +4368,8 @@
         </p:blipFill>
         <p:spPr>
           <a:xfrm>
-            <a:off x="4194440" y="1467465"/>
-            <a:ext cx="3964800" cy="2973600"/>
+            <a:off x="3999345" y="3580366"/>
+            <a:ext cx="4080000" cy="3060000"/>
           </a:xfrm>
           <a:prstGeom prst="rect">
             <a:avLst/>
@@ -4066,7 +4378,200 @@
       </p:pic>
       <p:pic>
         <p:nvPicPr>
-          <p:cNvPr id="7" name="图片 6"/>
+          <p:cNvPr id="15" name="图片 14">
+            <a:extLst>
+              <a:ext uri="{FF2B5EF4-FFF2-40B4-BE49-F238E27FC236}">
+                <a16:creationId xmlns:a16="http://schemas.microsoft.com/office/drawing/2014/main" id="{CCC4BFC9-DC80-42A8-9B51-6223AC0D4B3D}"/>
+              </a:ext>
+            </a:extLst>
+          </p:cNvPr>
+          <p:cNvPicPr>
+            <a:picLocks noChangeAspect="1"/>
+          </p:cNvPicPr>
+          <p:nvPr/>
+        </p:nvPicPr>
+        <p:blipFill>
+          <a:blip r:embed="rId7"/>
+          <a:stretch>
+            <a:fillRect/>
+          </a:stretch>
+        </p:blipFill>
+        <p:spPr>
+          <a:xfrm>
+            <a:off x="7421255" y="3580366"/>
+            <a:ext cx="4080000" cy="3060000"/>
+          </a:xfrm>
+          <a:prstGeom prst="rect">
+            <a:avLst/>
+          </a:prstGeom>
+        </p:spPr>
+      </p:pic>
+    </p:spTree>
+    <p:extLst>
+      <p:ext uri="{BB962C8B-B14F-4D97-AF65-F5344CB8AC3E}">
+        <p14:creationId xmlns:p14="http://schemas.microsoft.com/office/powerpoint/2010/main" val="3121898424"/>
+      </p:ext>
+    </p:extLst>
+  </p:cSld>
+  <p:clrMapOvr>
+    <a:masterClrMapping/>
+  </p:clrMapOvr>
+  <p:timing>
+    <p:tnLst>
+      <p:par>
+        <p:cTn id="1" dur="indefinite" restart="never" nodeType="tmRoot"/>
+      </p:par>
+    </p:tnLst>
+  </p:timing>
+</p:sld>
+</file>
+
+<file path=ppt/slides/slide5.xml><?xml version="1.0" encoding="utf-8"?>
+<p:sld xmlns:a="http://schemas.openxmlformats.org/drawingml/2006/main" xmlns:r="http://schemas.openxmlformats.org/officeDocument/2006/relationships" xmlns:p="http://schemas.openxmlformats.org/presentationml/2006/main">
+  <p:cSld>
+    <p:spTree>
+      <p:nvGrpSpPr>
+        <p:cNvPr id="1" name=""/>
+        <p:cNvGrpSpPr/>
+        <p:nvPr/>
+      </p:nvGrpSpPr>
+      <p:grpSpPr>
+        <a:xfrm>
+          <a:off x="0" y="0"/>
+          <a:ext cx="0" cy="0"/>
+          <a:chOff x="0" y="0"/>
+          <a:chExt cx="0" cy="0"/>
+        </a:xfrm>
+      </p:grpSpPr>
+      <p:pic>
+        <p:nvPicPr>
+          <p:cNvPr id="5" name="图片 4">
+            <a:extLst>
+              <a:ext uri="{FF2B5EF4-FFF2-40B4-BE49-F238E27FC236}">
+                <a16:creationId xmlns:a16="http://schemas.microsoft.com/office/drawing/2014/main" id="{B31BBDC7-17A8-45E2-8580-ADFB61FC8CE3}"/>
+              </a:ext>
+            </a:extLst>
+          </p:cNvPr>
+          <p:cNvPicPr>
+            <a:picLocks noChangeAspect="1"/>
+          </p:cNvPicPr>
+          <p:nvPr/>
+        </p:nvPicPr>
+        <p:blipFill>
+          <a:blip r:embed="rId2"/>
+          <a:stretch>
+            <a:fillRect/>
+          </a:stretch>
+        </p:blipFill>
+        <p:spPr>
+          <a:xfrm>
+            <a:off x="757382" y="477983"/>
+            <a:ext cx="4080000" cy="3060000"/>
+          </a:xfrm>
+          <a:prstGeom prst="rect">
+            <a:avLst/>
+          </a:prstGeom>
+        </p:spPr>
+      </p:pic>
+      <p:pic>
+        <p:nvPicPr>
+          <p:cNvPr id="7" name="图片 6">
+            <a:extLst>
+              <a:ext uri="{FF2B5EF4-FFF2-40B4-BE49-F238E27FC236}">
+                <a16:creationId xmlns:a16="http://schemas.microsoft.com/office/drawing/2014/main" id="{70EE4359-D9FE-4638-AB0B-B6D88F00D783}"/>
+              </a:ext>
+            </a:extLst>
+          </p:cNvPr>
+          <p:cNvPicPr>
+            <a:picLocks noChangeAspect="1"/>
+          </p:cNvPicPr>
+          <p:nvPr/>
+        </p:nvPicPr>
+        <p:blipFill>
+          <a:blip r:embed="rId3"/>
+          <a:stretch>
+            <a:fillRect/>
+          </a:stretch>
+        </p:blipFill>
+        <p:spPr>
+          <a:xfrm>
+            <a:off x="3990109" y="477983"/>
+            <a:ext cx="4080000" cy="3060000"/>
+          </a:xfrm>
+          <a:prstGeom prst="rect">
+            <a:avLst/>
+          </a:prstGeom>
+        </p:spPr>
+      </p:pic>
+      <p:pic>
+        <p:nvPicPr>
+          <p:cNvPr id="9" name="图片 8">
+            <a:extLst>
+              <a:ext uri="{FF2B5EF4-FFF2-40B4-BE49-F238E27FC236}">
+                <a16:creationId xmlns:a16="http://schemas.microsoft.com/office/drawing/2014/main" id="{5BEC64BC-92E5-4515-AB38-7F90D3FBE535}"/>
+              </a:ext>
+            </a:extLst>
+          </p:cNvPr>
+          <p:cNvPicPr>
+            <a:picLocks noChangeAspect="1"/>
+          </p:cNvPicPr>
+          <p:nvPr/>
+        </p:nvPicPr>
+        <p:blipFill>
+          <a:blip r:embed="rId4"/>
+          <a:stretch>
+            <a:fillRect/>
+          </a:stretch>
+        </p:blipFill>
+        <p:spPr>
+          <a:xfrm>
+            <a:off x="7222836" y="477983"/>
+            <a:ext cx="4080000" cy="3060000"/>
+          </a:xfrm>
+          <a:prstGeom prst="rect">
+            <a:avLst/>
+          </a:prstGeom>
+        </p:spPr>
+      </p:pic>
+      <p:pic>
+        <p:nvPicPr>
+          <p:cNvPr id="11" name="图片 10">
+            <a:extLst>
+              <a:ext uri="{FF2B5EF4-FFF2-40B4-BE49-F238E27FC236}">
+                <a16:creationId xmlns:a16="http://schemas.microsoft.com/office/drawing/2014/main" id="{8E8E7332-91BE-4E61-8413-27D0978F6AFC}"/>
+              </a:ext>
+            </a:extLst>
+          </p:cNvPr>
+          <p:cNvPicPr>
+            <a:picLocks noChangeAspect="1"/>
+          </p:cNvPicPr>
+          <p:nvPr/>
+        </p:nvPicPr>
+        <p:blipFill>
+          <a:blip r:embed="rId5"/>
+          <a:stretch>
+            <a:fillRect/>
+          </a:stretch>
+        </p:blipFill>
+        <p:spPr>
+          <a:xfrm>
+            <a:off x="757382" y="3798000"/>
+            <a:ext cx="4080000" cy="3060000"/>
+          </a:xfrm>
+          <a:prstGeom prst="rect">
+            <a:avLst/>
+          </a:prstGeom>
+        </p:spPr>
+      </p:pic>
+      <p:pic>
+        <p:nvPicPr>
+          <p:cNvPr id="13" name="图片 12">
+            <a:extLst>
+              <a:ext uri="{FF2B5EF4-FFF2-40B4-BE49-F238E27FC236}">
+                <a16:creationId xmlns:a16="http://schemas.microsoft.com/office/drawing/2014/main" id="{B7B12158-ED88-4070-A9CF-AE3D10F49379}"/>
+              </a:ext>
+            </a:extLst>
+          </p:cNvPr>
           <p:cNvPicPr>
             <a:picLocks noChangeAspect="1"/>
           </p:cNvPicPr>
@@ -4080,8 +4585,8 @@
         </p:blipFill>
         <p:spPr>
           <a:xfrm>
-            <a:off x="8159240" y="1467465"/>
-            <a:ext cx="3964800" cy="2973600"/>
+            <a:off x="3990108" y="3804472"/>
+            <a:ext cx="4080000" cy="3060000"/>
           </a:xfrm>
           <a:prstGeom prst="rect">
             <a:avLst/>
@@ -4090,7 +4595,13 @@
       </p:pic>
       <p:pic>
         <p:nvPicPr>
-          <p:cNvPr id="8" name="图片 7"/>
+          <p:cNvPr id="15" name="图片 14">
+            <a:extLst>
+              <a:ext uri="{FF2B5EF4-FFF2-40B4-BE49-F238E27FC236}">
+                <a16:creationId xmlns:a16="http://schemas.microsoft.com/office/drawing/2014/main" id="{42AD7286-CF4A-4E47-A225-9C377848C197}"/>
+              </a:ext>
+            </a:extLst>
+          </p:cNvPr>
           <p:cNvPicPr>
             <a:picLocks noChangeAspect="1"/>
           </p:cNvPicPr>
@@ -4104,17 +4615,198 @@
         </p:blipFill>
         <p:spPr>
           <a:xfrm>
-            <a:off x="228107" y="3638428"/>
-            <a:ext cx="3964800" cy="2973600"/>
+            <a:off x="7222834" y="3798000"/>
+            <a:ext cx="4080000" cy="3060000"/>
           </a:xfrm>
           <a:prstGeom prst="rect">
             <a:avLst/>
           </a:prstGeom>
         </p:spPr>
       </p:pic>
+    </p:spTree>
+    <p:extLst>
+      <p:ext uri="{BB962C8B-B14F-4D97-AF65-F5344CB8AC3E}">
+        <p14:creationId xmlns:p14="http://schemas.microsoft.com/office/powerpoint/2010/main" val="535985543"/>
+      </p:ext>
+    </p:extLst>
+  </p:cSld>
+  <p:clrMapOvr>
+    <a:masterClrMapping/>
+  </p:clrMapOvr>
+  <p:timing>
+    <p:tnLst>
+      <p:par>
+        <p:cTn id="1" dur="indefinite" restart="never" nodeType="tmRoot"/>
+      </p:par>
+    </p:tnLst>
+  </p:timing>
+</p:sld>
+</file>
+
+<file path=ppt/slides/slide6.xml><?xml version="1.0" encoding="utf-8"?>
+<p:sld xmlns:a="http://schemas.openxmlformats.org/drawingml/2006/main" xmlns:r="http://schemas.openxmlformats.org/officeDocument/2006/relationships" xmlns:p="http://schemas.openxmlformats.org/presentationml/2006/main">
+  <p:cSld>
+    <p:spTree>
+      <p:nvGrpSpPr>
+        <p:cNvPr id="1" name=""/>
+        <p:cNvGrpSpPr/>
+        <p:nvPr/>
+      </p:nvGrpSpPr>
+      <p:grpSpPr>
+        <a:xfrm>
+          <a:off x="0" y="0"/>
+          <a:ext cx="0" cy="0"/>
+          <a:chOff x="0" y="0"/>
+          <a:chExt cx="0" cy="0"/>
+        </a:xfrm>
+      </p:grpSpPr>
       <p:pic>
         <p:nvPicPr>
-          <p:cNvPr id="9" name="图片 8"/>
+          <p:cNvPr id="2" name="图片 1"/>
+          <p:cNvPicPr>
+            <a:picLocks noChangeAspect="1"/>
+          </p:cNvPicPr>
+          <p:nvPr/>
+        </p:nvPicPr>
+        <p:blipFill>
+          <a:blip r:embed="rId3"/>
+          <a:stretch>
+            <a:fillRect/>
+          </a:stretch>
+        </p:blipFill>
+        <p:spPr>
+          <a:xfrm>
+            <a:off x="228107" y="-703498"/>
+            <a:ext cx="3966333" cy="2974750"/>
+          </a:xfrm>
+          <a:prstGeom prst="rect">
+            <a:avLst/>
+          </a:prstGeom>
+        </p:spPr>
+      </p:pic>
+      <p:pic>
+        <p:nvPicPr>
+          <p:cNvPr id="3" name="图片 2"/>
+          <p:cNvPicPr>
+            <a:picLocks noChangeAspect="1"/>
+          </p:cNvPicPr>
+          <p:nvPr/>
+        </p:nvPicPr>
+        <p:blipFill>
+          <a:blip r:embed="rId4"/>
+          <a:stretch>
+            <a:fillRect/>
+          </a:stretch>
+        </p:blipFill>
+        <p:spPr>
+          <a:xfrm>
+            <a:off x="4194440" y="-703498"/>
+            <a:ext cx="3964800" cy="2973600"/>
+          </a:xfrm>
+          <a:prstGeom prst="rect">
+            <a:avLst/>
+          </a:prstGeom>
+        </p:spPr>
+      </p:pic>
+      <p:pic>
+        <p:nvPicPr>
+          <p:cNvPr id="4" name="图片 3"/>
+          <p:cNvPicPr>
+            <a:picLocks noChangeAspect="1"/>
+          </p:cNvPicPr>
+          <p:nvPr/>
+        </p:nvPicPr>
+        <p:blipFill>
+          <a:blip r:embed="rId5"/>
+          <a:stretch>
+            <a:fillRect/>
+          </a:stretch>
+        </p:blipFill>
+        <p:spPr>
+          <a:xfrm>
+            <a:off x="8159240" y="-703498"/>
+            <a:ext cx="3964800" cy="2973600"/>
+          </a:xfrm>
+          <a:prstGeom prst="rect">
+            <a:avLst/>
+          </a:prstGeom>
+        </p:spPr>
+      </p:pic>
+      <p:pic>
+        <p:nvPicPr>
+          <p:cNvPr id="5" name="图片 4"/>
+          <p:cNvPicPr>
+            <a:picLocks noChangeAspect="1"/>
+          </p:cNvPicPr>
+          <p:nvPr/>
+        </p:nvPicPr>
+        <p:blipFill>
+          <a:blip r:embed="rId6"/>
+          <a:stretch>
+            <a:fillRect/>
+          </a:stretch>
+        </p:blipFill>
+        <p:spPr>
+          <a:xfrm>
+            <a:off x="229640" y="1467465"/>
+            <a:ext cx="3964800" cy="2973600"/>
+          </a:xfrm>
+          <a:prstGeom prst="rect">
+            <a:avLst/>
+          </a:prstGeom>
+        </p:spPr>
+      </p:pic>
+      <p:pic>
+        <p:nvPicPr>
+          <p:cNvPr id="6" name="图片 5"/>
+          <p:cNvPicPr>
+            <a:picLocks noChangeAspect="1"/>
+          </p:cNvPicPr>
+          <p:nvPr/>
+        </p:nvPicPr>
+        <p:blipFill>
+          <a:blip r:embed="rId7"/>
+          <a:stretch>
+            <a:fillRect/>
+          </a:stretch>
+        </p:blipFill>
+        <p:spPr>
+          <a:xfrm>
+            <a:off x="4194440" y="1467465"/>
+            <a:ext cx="3964800" cy="2973600"/>
+          </a:xfrm>
+          <a:prstGeom prst="rect">
+            <a:avLst/>
+          </a:prstGeom>
+        </p:spPr>
+      </p:pic>
+      <p:pic>
+        <p:nvPicPr>
+          <p:cNvPr id="7" name="图片 6"/>
+          <p:cNvPicPr>
+            <a:picLocks noChangeAspect="1"/>
+          </p:cNvPicPr>
+          <p:nvPr/>
+        </p:nvPicPr>
+        <p:blipFill>
+          <a:blip r:embed="rId7"/>
+          <a:stretch>
+            <a:fillRect/>
+          </a:stretch>
+        </p:blipFill>
+        <p:spPr>
+          <a:xfrm>
+            <a:off x="8159240" y="1467465"/>
+            <a:ext cx="3964800" cy="2973600"/>
+          </a:xfrm>
+          <a:prstGeom prst="rect">
+            <a:avLst/>
+          </a:prstGeom>
+        </p:spPr>
+      </p:pic>
+      <p:pic>
+        <p:nvPicPr>
+          <p:cNvPr id="8" name="图片 7"/>
           <p:cNvPicPr>
             <a:picLocks noChangeAspect="1"/>
           </p:cNvPicPr>
@@ -4128,6 +4820,30 @@
         </p:blipFill>
         <p:spPr>
           <a:xfrm>
+            <a:off x="228107" y="3638428"/>
+            <a:ext cx="3964800" cy="2973600"/>
+          </a:xfrm>
+          <a:prstGeom prst="rect">
+            <a:avLst/>
+          </a:prstGeom>
+        </p:spPr>
+      </p:pic>
+      <p:pic>
+        <p:nvPicPr>
+          <p:cNvPr id="9" name="图片 8"/>
+          <p:cNvPicPr>
+            <a:picLocks noChangeAspect="1"/>
+          </p:cNvPicPr>
+          <p:nvPr/>
+        </p:nvPicPr>
+        <p:blipFill>
+          <a:blip r:embed="rId9"/>
+          <a:stretch>
+            <a:fillRect/>
+          </a:stretch>
+        </p:blipFill>
+        <p:spPr>
+          <a:xfrm>
             <a:off x="4192907" y="3638428"/>
             <a:ext cx="3964800" cy="2973600"/>
           </a:xfrm>
@@ -4145,7 +4861,7 @@
           <p:nvPr/>
         </p:nvPicPr>
         <p:blipFill>
-          <a:blip r:embed="rId9"/>
+          <a:blip r:embed="rId10"/>
           <a:stretch>
             <a:fillRect/>
           </a:stretch>
@@ -4473,4 +5189,265 @@
     </a:ext>
   </a:extLst>
 </a:theme>
+</file>
+
+<file path=ppt/theme/theme2.xml><?xml version="1.0" encoding="utf-8"?>
+<a:theme xmlns:a="http://schemas.openxmlformats.org/drawingml/2006/main" name="Office 主题​​">
+  <a:themeElements>
+    <a:clrScheme name="Office">
+      <a:dk1>
+        <a:sysClr val="windowText" lastClr="000000"/>
+      </a:dk1>
+      <a:lt1>
+        <a:sysClr val="window" lastClr="FFFFFF"/>
+      </a:lt1>
+      <a:dk2>
+        <a:srgbClr val="44546A"/>
+      </a:dk2>
+      <a:lt2>
+        <a:srgbClr val="E7E6E6"/>
+      </a:lt2>
+      <a:accent1>
+        <a:srgbClr val="5B9BD5"/>
+      </a:accent1>
+      <a:accent2>
+        <a:srgbClr val="ED7D31"/>
+      </a:accent2>
+      <a:accent3>
+        <a:srgbClr val="A5A5A5"/>
+      </a:accent3>
+      <a:accent4>
+        <a:srgbClr val="FFC000"/>
+      </a:accent4>
+      <a:accent5>
+        <a:srgbClr val="4472C4"/>
+      </a:accent5>
+      <a:accent6>
+        <a:srgbClr val="70AD47"/>
+      </a:accent6>
+      <a:hlink>
+        <a:srgbClr val="0563C1"/>
+      </a:hlink>
+      <a:folHlink>
+        <a:srgbClr val="954F72"/>
+      </a:folHlink>
+    </a:clrScheme>
+    <a:fontScheme name="Office">
+      <a:majorFont>
+        <a:latin typeface="等线 Light" panose="020F0302020204030204"/>
+        <a:ea typeface=""/>
+        <a:cs typeface=""/>
+        <a:font script="Jpan" typeface="游ゴシック Light"/>
+        <a:font script="Hang" typeface="맑은 고딕"/>
+        <a:font script="Hans" typeface="等线 Light"/>
+        <a:font script="Hant" typeface="新細明體"/>
+        <a:font script="Arab" typeface="Times New Roman"/>
+        <a:font script="Hebr" typeface="Times New Roman"/>
+        <a:font script="Thai" typeface="Angsana New"/>
+        <a:font script="Ethi" typeface="Nyala"/>
+        <a:font script="Beng" typeface="Vrinda"/>
+        <a:font script="Gujr" typeface="Shruti"/>
+        <a:font script="Khmr" typeface="MoolBoran"/>
+        <a:font script="Knda" typeface="Tunga"/>
+        <a:font script="Guru" typeface="Raavi"/>
+        <a:font script="Cans" typeface="Euphemia"/>
+        <a:font script="Cher" typeface="Plantagenet Cherokee"/>
+        <a:font script="Yiii" typeface="Microsoft Yi Baiti"/>
+        <a:font script="Tibt" typeface="Microsoft Himalaya"/>
+        <a:font script="Thaa" typeface="MV Boli"/>
+        <a:font script="Deva" typeface="Mangal"/>
+        <a:font script="Telu" typeface="Gautami"/>
+        <a:font script="Taml" typeface="Latha"/>
+        <a:font script="Syrc" typeface="Estrangelo Edessa"/>
+        <a:font script="Orya" typeface="Kalinga"/>
+        <a:font script="Mlym" typeface="Kartika"/>
+        <a:font script="Laoo" typeface="DokChampa"/>
+        <a:font script="Sinh" typeface="Iskoola Pota"/>
+        <a:font script="Mong" typeface="Mongolian Baiti"/>
+        <a:font script="Viet" typeface="Times New Roman"/>
+        <a:font script="Uigh" typeface="Microsoft Uighur"/>
+        <a:font script="Geor" typeface="Sylfaen"/>
+      </a:majorFont>
+      <a:minorFont>
+        <a:latin typeface="等线" panose="020F0502020204030204"/>
+        <a:ea typeface=""/>
+        <a:cs typeface=""/>
+        <a:font script="Jpan" typeface="游ゴシック"/>
+        <a:font script="Hang" typeface="맑은 고딕"/>
+        <a:font script="Hans" typeface="等线"/>
+        <a:font script="Hant" typeface="新細明體"/>
+        <a:font script="Arab" typeface="Arial"/>
+        <a:font script="Hebr" typeface="Arial"/>
+        <a:font script="Thai" typeface="Cordia New"/>
+        <a:font script="Ethi" typeface="Nyala"/>
+        <a:font script="Beng" typeface="Vrinda"/>
+        <a:font script="Gujr" typeface="Shruti"/>
+        <a:font script="Khmr" typeface="DaunPenh"/>
+        <a:font script="Knda" typeface="Tunga"/>
+        <a:font script="Guru" typeface="Raavi"/>
+        <a:font script="Cans" typeface="Euphemia"/>
+        <a:font script="Cher" typeface="Plantagenet Cherokee"/>
+        <a:font script="Yiii" typeface="Microsoft Yi Baiti"/>
+        <a:font script="Tibt" typeface="Microsoft Himalaya"/>
+        <a:font script="Thaa" typeface="MV Boli"/>
+        <a:font script="Deva" typeface="Mangal"/>
+        <a:font script="Telu" typeface="Gautami"/>
+        <a:font script="Taml" typeface="Latha"/>
+        <a:font script="Syrc" typeface="Estrangelo Edessa"/>
+        <a:font script="Orya" typeface="Kalinga"/>
+        <a:font script="Mlym" typeface="Kartika"/>
+        <a:font script="Laoo" typeface="DokChampa"/>
+        <a:font script="Sinh" typeface="Iskoola Pota"/>
+        <a:font script="Mong" typeface="Mongolian Baiti"/>
+        <a:font script="Viet" typeface="Arial"/>
+        <a:font script="Uigh" typeface="Microsoft Uighur"/>
+        <a:font script="Geor" typeface="Sylfaen"/>
+      </a:minorFont>
+    </a:fontScheme>
+    <a:fmtScheme name="Office">
+      <a:fillStyleLst>
+        <a:solidFill>
+          <a:schemeClr val="phClr"/>
+        </a:solidFill>
+        <a:gradFill rotWithShape="1">
+          <a:gsLst>
+            <a:gs pos="0">
+              <a:schemeClr val="phClr">
+                <a:lumMod val="110000"/>
+                <a:satMod val="105000"/>
+                <a:tint val="67000"/>
+              </a:schemeClr>
+            </a:gs>
+            <a:gs pos="50000">
+              <a:schemeClr val="phClr">
+                <a:lumMod val="105000"/>
+                <a:satMod val="103000"/>
+                <a:tint val="73000"/>
+              </a:schemeClr>
+            </a:gs>
+            <a:gs pos="100000">
+              <a:schemeClr val="phClr">
+                <a:lumMod val="105000"/>
+                <a:satMod val="109000"/>
+                <a:tint val="81000"/>
+              </a:schemeClr>
+            </a:gs>
+          </a:gsLst>
+          <a:lin ang="5400000" scaled="0"/>
+        </a:gradFill>
+        <a:gradFill rotWithShape="1">
+          <a:gsLst>
+            <a:gs pos="0">
+              <a:schemeClr val="phClr">
+                <a:satMod val="103000"/>
+                <a:lumMod val="102000"/>
+                <a:tint val="94000"/>
+              </a:schemeClr>
+            </a:gs>
+            <a:gs pos="50000">
+              <a:schemeClr val="phClr">
+                <a:satMod val="110000"/>
+                <a:lumMod val="100000"/>
+                <a:shade val="100000"/>
+              </a:schemeClr>
+            </a:gs>
+            <a:gs pos="100000">
+              <a:schemeClr val="phClr">
+                <a:lumMod val="99000"/>
+                <a:satMod val="120000"/>
+                <a:shade val="78000"/>
+              </a:schemeClr>
+            </a:gs>
+          </a:gsLst>
+          <a:lin ang="5400000" scaled="0"/>
+        </a:gradFill>
+      </a:fillStyleLst>
+      <a:lnStyleLst>
+        <a:ln w="6350" cap="flat" cmpd="sng" algn="ctr">
+          <a:solidFill>
+            <a:schemeClr val="phClr"/>
+          </a:solidFill>
+          <a:prstDash val="solid"/>
+          <a:miter lim="800000"/>
+        </a:ln>
+        <a:ln w="12700" cap="flat" cmpd="sng" algn="ctr">
+          <a:solidFill>
+            <a:schemeClr val="phClr"/>
+          </a:solidFill>
+          <a:prstDash val="solid"/>
+          <a:miter lim="800000"/>
+        </a:ln>
+        <a:ln w="19050" cap="flat" cmpd="sng" algn="ctr">
+          <a:solidFill>
+            <a:schemeClr val="phClr"/>
+          </a:solidFill>
+          <a:prstDash val="solid"/>
+          <a:miter lim="800000"/>
+        </a:ln>
+      </a:lnStyleLst>
+      <a:effectStyleLst>
+        <a:effectStyle>
+          <a:effectLst/>
+        </a:effectStyle>
+        <a:effectStyle>
+          <a:effectLst/>
+        </a:effectStyle>
+        <a:effectStyle>
+          <a:effectLst>
+            <a:outerShdw blurRad="57150" dist="19050" dir="5400000" algn="ctr" rotWithShape="0">
+              <a:srgbClr val="000000">
+                <a:alpha val="63000"/>
+              </a:srgbClr>
+            </a:outerShdw>
+          </a:effectLst>
+        </a:effectStyle>
+      </a:effectStyleLst>
+      <a:bgFillStyleLst>
+        <a:solidFill>
+          <a:schemeClr val="phClr"/>
+        </a:solidFill>
+        <a:solidFill>
+          <a:schemeClr val="phClr">
+            <a:tint val="95000"/>
+            <a:satMod val="170000"/>
+          </a:schemeClr>
+        </a:solidFill>
+        <a:gradFill rotWithShape="1">
+          <a:gsLst>
+            <a:gs pos="0">
+              <a:schemeClr val="phClr">
+                <a:tint val="93000"/>
+                <a:satMod val="150000"/>
+                <a:shade val="98000"/>
+                <a:lumMod val="102000"/>
+              </a:schemeClr>
+            </a:gs>
+            <a:gs pos="50000">
+              <a:schemeClr val="phClr">
+                <a:tint val="98000"/>
+                <a:satMod val="130000"/>
+                <a:shade val="90000"/>
+                <a:lumMod val="103000"/>
+              </a:schemeClr>
+            </a:gs>
+            <a:gs pos="100000">
+              <a:schemeClr val="phClr">
+                <a:shade val="63000"/>
+                <a:satMod val="120000"/>
+              </a:schemeClr>
+            </a:gs>
+          </a:gsLst>
+          <a:lin ang="5400000" scaled="0"/>
+        </a:gradFill>
+      </a:bgFillStyleLst>
+    </a:fmtScheme>
+  </a:themeElements>
+  <a:objectDefaults/>
+  <a:extraClrSchemeLst/>
+  <a:extLst>
+    <a:ext uri="{05A4C25C-085E-4340-85A3-A5531E510DB2}">
+      <thm15:themeFamily xmlns:thm15="http://schemas.microsoft.com/office/thememl/2012/main" name="Office Theme" id="{62F939B6-93AF-4DB8-9C6B-D6C7DFDC589F}" vid="{4A3C46E8-61CC-4603-A589-7422A47A8E4A}"/>
+    </a:ext>
+  </a:extLst>
+</a:theme>
 </file>
</xml_diff>